<commit_message>
Thursday 4/7/ slides set
</commit_message>
<xml_diff>
--- a/slides/cds431_week3_1.pptx
+++ b/slides/cds431_week3_1.pptx
@@ -204,7 +204,7 @@
           <a:p>
             <a:fld id="{F01B0C5B-6AC4-4E44-99B5-271F1AF86AF6}" type="datetimeFigureOut">
               <a:rPr lang="en-US" smtClean="0"/>
-              <a:t>2/3/22</a:t>
+              <a:t>4/5/22</a:t>
             </a:fld>
             <a:endParaRPr lang="en-US"/>
           </a:p>
@@ -894,7 +894,7 @@
           <a:p>
             <a:fld id="{015D8EB0-2C7B-B347-A87E-0659F0F91EA4}" type="datetimeFigureOut">
               <a:rPr lang="en-US" smtClean="0"/>
-              <a:t>2/3/22</a:t>
+              <a:t>4/5/22</a:t>
             </a:fld>
             <a:endParaRPr lang="en-US"/>
           </a:p>
@@ -1092,7 +1092,7 @@
           <a:p>
             <a:fld id="{015D8EB0-2C7B-B347-A87E-0659F0F91EA4}" type="datetimeFigureOut">
               <a:rPr lang="en-US" smtClean="0"/>
-              <a:t>2/3/22</a:t>
+              <a:t>4/5/22</a:t>
             </a:fld>
             <a:endParaRPr lang="en-US"/>
           </a:p>
@@ -1300,7 +1300,7 @@
           <a:p>
             <a:fld id="{015D8EB0-2C7B-B347-A87E-0659F0F91EA4}" type="datetimeFigureOut">
               <a:rPr lang="en-US" smtClean="0"/>
-              <a:t>2/3/22</a:t>
+              <a:t>4/5/22</a:t>
             </a:fld>
             <a:endParaRPr lang="en-US"/>
           </a:p>
@@ -1498,7 +1498,7 @@
           <a:p>
             <a:fld id="{015D8EB0-2C7B-B347-A87E-0659F0F91EA4}" type="datetimeFigureOut">
               <a:rPr lang="en-US" smtClean="0"/>
-              <a:t>2/3/22</a:t>
+              <a:t>4/5/22</a:t>
             </a:fld>
             <a:endParaRPr lang="en-US"/>
           </a:p>
@@ -1773,7 +1773,7 @@
           <a:p>
             <a:fld id="{015D8EB0-2C7B-B347-A87E-0659F0F91EA4}" type="datetimeFigureOut">
               <a:rPr lang="en-US" smtClean="0"/>
-              <a:t>2/3/22</a:t>
+              <a:t>4/5/22</a:t>
             </a:fld>
             <a:endParaRPr lang="en-US"/>
           </a:p>
@@ -2038,7 +2038,7 @@
           <a:p>
             <a:fld id="{015D8EB0-2C7B-B347-A87E-0659F0F91EA4}" type="datetimeFigureOut">
               <a:rPr lang="en-US" smtClean="0"/>
-              <a:t>2/3/22</a:t>
+              <a:t>4/5/22</a:t>
             </a:fld>
             <a:endParaRPr lang="en-US"/>
           </a:p>
@@ -2450,7 +2450,7 @@
           <a:p>
             <a:fld id="{015D8EB0-2C7B-B347-A87E-0659F0F91EA4}" type="datetimeFigureOut">
               <a:rPr lang="en-US" smtClean="0"/>
-              <a:t>2/3/22</a:t>
+              <a:t>4/5/22</a:t>
             </a:fld>
             <a:endParaRPr lang="en-US"/>
           </a:p>
@@ -2591,7 +2591,7 @@
           <a:p>
             <a:fld id="{015D8EB0-2C7B-B347-A87E-0659F0F91EA4}" type="datetimeFigureOut">
               <a:rPr lang="en-US" smtClean="0"/>
-              <a:t>2/3/22</a:t>
+              <a:t>4/5/22</a:t>
             </a:fld>
             <a:endParaRPr lang="en-US"/>
           </a:p>
@@ -2704,7 +2704,7 @@
           <a:p>
             <a:fld id="{015D8EB0-2C7B-B347-A87E-0659F0F91EA4}" type="datetimeFigureOut">
               <a:rPr lang="en-US" smtClean="0"/>
-              <a:t>2/3/22</a:t>
+              <a:t>4/5/22</a:t>
             </a:fld>
             <a:endParaRPr lang="en-US"/>
           </a:p>
@@ -3015,7 +3015,7 @@
           <a:p>
             <a:fld id="{015D8EB0-2C7B-B347-A87E-0659F0F91EA4}" type="datetimeFigureOut">
               <a:rPr lang="en-US" smtClean="0"/>
-              <a:t>2/3/22</a:t>
+              <a:t>4/5/22</a:t>
             </a:fld>
             <a:endParaRPr lang="en-US"/>
           </a:p>
@@ -3303,7 +3303,7 @@
           <a:p>
             <a:fld id="{015D8EB0-2C7B-B347-A87E-0659F0F91EA4}" type="datetimeFigureOut">
               <a:rPr lang="en-US" smtClean="0"/>
-              <a:t>2/3/22</a:t>
+              <a:t>4/5/22</a:t>
             </a:fld>
             <a:endParaRPr lang="en-US"/>
           </a:p>
@@ -3574,7 +3574,7 @@
           <a:p>
             <a:fld id="{015D8EB0-2C7B-B347-A87E-0659F0F91EA4}" type="datetimeFigureOut">
               <a:rPr lang="en-US" smtClean="0"/>
-              <a:t>2/3/22</a:t>
+              <a:t>4/5/22</a:t>
             </a:fld>
             <a:endParaRPr lang="en-US"/>
           </a:p>
@@ -4969,6 +4969,13 @@
               <a:rPr lang="en-US" dirty="0"/>
               <a:t>Video Title: SSD 2 Matthew DX1 Final Cluster Stop plus Fricative Probe</a:t>
             </a:r>
+          </a:p>
+          <a:p>
+            <a:r>
+              <a:rPr lang="en-US"/>
+              <a:t>Add more videos for sound probes </a:t>
+            </a:r>
+            <a:endParaRPr lang="en-US" dirty="0"/>
           </a:p>
         </p:txBody>
       </p:sp>

</xml_diff>

<commit_message>
Week 3 Tuesday slides added
</commit_message>
<xml_diff>
--- a/slides/cds431_week3_1.pptx
+++ b/slides/cds431_week3_1.pptx
@@ -204,7 +204,7 @@
           <a:p>
             <a:fld id="{F01B0C5B-6AC4-4E44-99B5-271F1AF86AF6}" type="datetimeFigureOut">
               <a:rPr lang="en-US" smtClean="0"/>
-              <a:t>4/5/22</a:t>
+              <a:t>4/7/22</a:t>
             </a:fld>
             <a:endParaRPr lang="en-US"/>
           </a:p>
@@ -894,7 +894,7 @@
           <a:p>
             <a:fld id="{015D8EB0-2C7B-B347-A87E-0659F0F91EA4}" type="datetimeFigureOut">
               <a:rPr lang="en-US" smtClean="0"/>
-              <a:t>4/5/22</a:t>
+              <a:t>4/7/22</a:t>
             </a:fld>
             <a:endParaRPr lang="en-US"/>
           </a:p>
@@ -1092,7 +1092,7 @@
           <a:p>
             <a:fld id="{015D8EB0-2C7B-B347-A87E-0659F0F91EA4}" type="datetimeFigureOut">
               <a:rPr lang="en-US" smtClean="0"/>
-              <a:t>4/5/22</a:t>
+              <a:t>4/7/22</a:t>
             </a:fld>
             <a:endParaRPr lang="en-US"/>
           </a:p>
@@ -1300,7 +1300,7 @@
           <a:p>
             <a:fld id="{015D8EB0-2C7B-B347-A87E-0659F0F91EA4}" type="datetimeFigureOut">
               <a:rPr lang="en-US" smtClean="0"/>
-              <a:t>4/5/22</a:t>
+              <a:t>4/7/22</a:t>
             </a:fld>
             <a:endParaRPr lang="en-US"/>
           </a:p>
@@ -1498,7 +1498,7 @@
           <a:p>
             <a:fld id="{015D8EB0-2C7B-B347-A87E-0659F0F91EA4}" type="datetimeFigureOut">
               <a:rPr lang="en-US" smtClean="0"/>
-              <a:t>4/5/22</a:t>
+              <a:t>4/7/22</a:t>
             </a:fld>
             <a:endParaRPr lang="en-US"/>
           </a:p>
@@ -1773,7 +1773,7 @@
           <a:p>
             <a:fld id="{015D8EB0-2C7B-B347-A87E-0659F0F91EA4}" type="datetimeFigureOut">
               <a:rPr lang="en-US" smtClean="0"/>
-              <a:t>4/5/22</a:t>
+              <a:t>4/7/22</a:t>
             </a:fld>
             <a:endParaRPr lang="en-US"/>
           </a:p>
@@ -2038,7 +2038,7 @@
           <a:p>
             <a:fld id="{015D8EB0-2C7B-B347-A87E-0659F0F91EA4}" type="datetimeFigureOut">
               <a:rPr lang="en-US" smtClean="0"/>
-              <a:t>4/5/22</a:t>
+              <a:t>4/7/22</a:t>
             </a:fld>
             <a:endParaRPr lang="en-US"/>
           </a:p>
@@ -2450,7 +2450,7 @@
           <a:p>
             <a:fld id="{015D8EB0-2C7B-B347-A87E-0659F0F91EA4}" type="datetimeFigureOut">
               <a:rPr lang="en-US" smtClean="0"/>
-              <a:t>4/5/22</a:t>
+              <a:t>4/7/22</a:t>
             </a:fld>
             <a:endParaRPr lang="en-US"/>
           </a:p>
@@ -2591,7 +2591,7 @@
           <a:p>
             <a:fld id="{015D8EB0-2C7B-B347-A87E-0659F0F91EA4}" type="datetimeFigureOut">
               <a:rPr lang="en-US" smtClean="0"/>
-              <a:t>4/5/22</a:t>
+              <a:t>4/7/22</a:t>
             </a:fld>
             <a:endParaRPr lang="en-US"/>
           </a:p>
@@ -2704,7 +2704,7 @@
           <a:p>
             <a:fld id="{015D8EB0-2C7B-B347-A87E-0659F0F91EA4}" type="datetimeFigureOut">
               <a:rPr lang="en-US" smtClean="0"/>
-              <a:t>4/5/22</a:t>
+              <a:t>4/7/22</a:t>
             </a:fld>
             <a:endParaRPr lang="en-US"/>
           </a:p>
@@ -3015,7 +3015,7 @@
           <a:p>
             <a:fld id="{015D8EB0-2C7B-B347-A87E-0659F0F91EA4}" type="datetimeFigureOut">
               <a:rPr lang="en-US" smtClean="0"/>
-              <a:t>4/5/22</a:t>
+              <a:t>4/7/22</a:t>
             </a:fld>
             <a:endParaRPr lang="en-US"/>
           </a:p>
@@ -3303,7 +3303,7 @@
           <a:p>
             <a:fld id="{015D8EB0-2C7B-B347-A87E-0659F0F91EA4}" type="datetimeFigureOut">
               <a:rPr lang="en-US" smtClean="0"/>
-              <a:t>4/5/22</a:t>
+              <a:t>4/7/22</a:t>
             </a:fld>
             <a:endParaRPr lang="en-US"/>
           </a:p>
@@ -3574,7 +3574,7 @@
           <a:p>
             <a:fld id="{015D8EB0-2C7B-B347-A87E-0659F0F91EA4}" type="datetimeFigureOut">
               <a:rPr lang="en-US" smtClean="0"/>
-              <a:t>4/5/22</a:t>
+              <a:t>4/7/22</a:t>
             </a:fld>
             <a:endParaRPr lang="en-US"/>
           </a:p>
@@ -4192,6 +4192,59 @@
           </a:prstGeom>
         </p:spPr>
       </p:pic>
+      <p:sp>
+        <p:nvSpPr>
+          <p:cNvPr id="3" name="TextBox 2">
+            <a:extLst>
+              <a:ext uri="{FF2B5EF4-FFF2-40B4-BE49-F238E27FC236}">
+                <a16:creationId xmlns:a16="http://schemas.microsoft.com/office/drawing/2014/main" id="{83C8024E-5604-9E4B-8312-513E3D2D3DA8}"/>
+              </a:ext>
+            </a:extLst>
+          </p:cNvPr>
+          <p:cNvSpPr txBox="1"/>
+          <p:nvPr/>
+        </p:nvSpPr>
+        <p:spPr>
+          <a:xfrm>
+            <a:off x="160021" y="1028700"/>
+            <a:ext cx="2379530" cy="3693319"/>
+          </a:xfrm>
+          <a:prstGeom prst="rect">
+            <a:avLst/>
+          </a:prstGeom>
+          <a:noFill/>
+        </p:spPr>
+        <p:txBody>
+          <a:bodyPr wrap="square" rtlCol="0">
+            <a:spAutoFit/>
+          </a:bodyPr>
+          <a:lstStyle/>
+          <a:p>
+            <a:r>
+              <a:rPr lang="en-US" dirty="0"/>
+              <a:t>Discussion Questions:</a:t>
+            </a:r>
+          </a:p>
+          <a:p>
+            <a:r>
+              <a:rPr lang="en-US" dirty="0"/>
+              <a:t>1.) What scores did Matthew obtain?</a:t>
+            </a:r>
+          </a:p>
+          <a:p>
+            <a:r>
+              <a:rPr lang="en-US" dirty="0"/>
+              <a:t>2.) What phonological patterns were identified and how frequent were they?</a:t>
+            </a:r>
+          </a:p>
+          <a:p>
+            <a:r>
+              <a:rPr lang="en-US" dirty="0"/>
+              <a:t>3.) Clinician behavior discussion: balance of keeping child engaged while tracking responses accurately and consistently</a:t>
+            </a:r>
+          </a:p>
+        </p:txBody>
+      </p:sp>
     </p:spTree>
     <p:extLst>
       <p:ext uri="{BB962C8B-B14F-4D97-AF65-F5344CB8AC3E}">
@@ -4281,6 +4334,36 @@
             <a:r>
               <a:rPr lang="en-US" dirty="0"/>
               <a:t>Video Title: SSD 6 Matthew DX1 CELF-P2</a:t>
+            </a:r>
+          </a:p>
+          <a:p>
+            <a:endParaRPr lang="en-US" dirty="0"/>
+          </a:p>
+          <a:p>
+            <a:r>
+              <a:rPr lang="en-US" dirty="0"/>
+              <a:t>Discussion questions:</a:t>
+            </a:r>
+          </a:p>
+          <a:p>
+            <a:pPr lvl="1"/>
+            <a:r>
+              <a:rPr lang="en-US" dirty="0"/>
+              <a:t>What kind of task is this? Expressive or receptive?</a:t>
+            </a:r>
+          </a:p>
+          <a:p>
+            <a:pPr lvl="1"/>
+            <a:r>
+              <a:rPr lang="en-US" dirty="0"/>
+              <a:t>How does Matthew appear to be doing on this subtest?</a:t>
+            </a:r>
+          </a:p>
+          <a:p>
+            <a:pPr lvl="1"/>
+            <a:r>
+              <a:rPr lang="en-US" dirty="0"/>
+              <a:t>Activity 6 will focus on interpretation of expressive language subtest. </a:t>
             </a:r>
           </a:p>
         </p:txBody>
@@ -4454,14 +4537,7 @@
           <a:p>
             <a:r>
               <a:rPr lang="en-US" sz="2000" dirty="0"/>
-              <a:t>Due to time limitations, you will only be watching/scoring two speech error probes.  The results of the other three probes are as follows:</a:t>
-            </a:r>
-          </a:p>
-          <a:p>
-            <a:pPr lvl="1"/>
-            <a:r>
-              <a:rPr lang="en-US" sz="2000" dirty="0"/>
-              <a:t>r- cluster probe: 0/35 correct (0%)</a:t>
+              <a:t>Due to time limitations, you will only be watching/scoring two speech error probes.  The results of the other two probes are as follows:</a:t>
             </a:r>
           </a:p>
           <a:p>
@@ -4628,6 +4704,26 @@
               <a:t>Video Title: SSD Matthew DX1 Pre-Vocalic Voicing </a:t>
             </a:r>
           </a:p>
+          <a:p>
+            <a:endParaRPr lang="en-US" dirty="0"/>
+          </a:p>
+          <a:p>
+            <a:r>
+              <a:rPr lang="en-US" dirty="0"/>
+              <a:t>Discussion question:</a:t>
+            </a:r>
+          </a:p>
+          <a:p>
+            <a:pPr lvl="1"/>
+            <a:r>
+              <a:rPr lang="en-US" dirty="0"/>
+              <a:t>What is the clinician doing to prompt the target word?</a:t>
+            </a:r>
+          </a:p>
+          <a:p>
+            <a:pPr lvl="1"/>
+            <a:endParaRPr lang="en-US" dirty="0"/>
+          </a:p>
         </p:txBody>
       </p:sp>
     </p:spTree>
@@ -4914,6 +5010,83 @@
           </a:p>
         </p:txBody>
       </p:sp>
+      <p:sp>
+        <p:nvSpPr>
+          <p:cNvPr id="4" name="TextBox 3">
+            <a:extLst>
+              <a:ext uri="{FF2B5EF4-FFF2-40B4-BE49-F238E27FC236}">
+                <a16:creationId xmlns:a16="http://schemas.microsoft.com/office/drawing/2014/main" id="{2954C844-DFB2-5D4C-A76A-7ADEDA3FD32C}"/>
+              </a:ext>
+            </a:extLst>
+          </p:cNvPr>
+          <p:cNvSpPr txBox="1"/>
+          <p:nvPr/>
+        </p:nvSpPr>
+        <p:spPr>
+          <a:xfrm>
+            <a:off x="217171" y="1817370"/>
+            <a:ext cx="1360170" cy="2031325"/>
+          </a:xfrm>
+          <a:prstGeom prst="rect">
+            <a:avLst/>
+          </a:prstGeom>
+          <a:noFill/>
+        </p:spPr>
+        <p:txBody>
+          <a:bodyPr wrap="square" rtlCol="0">
+            <a:spAutoFit/>
+          </a:bodyPr>
+          <a:lstStyle/>
+          <a:p>
+            <a:r>
+              <a:rPr lang="en-US" dirty="0"/>
+              <a:t>Video Title: SSD Matthew DX2 Final cluster plus fricative</a:t>
+            </a:r>
+          </a:p>
+          <a:p>
+            <a:endParaRPr lang="en-US" dirty="0"/>
+          </a:p>
+        </p:txBody>
+      </p:sp>
+      <p:sp>
+        <p:nvSpPr>
+          <p:cNvPr id="5" name="TextBox 4">
+            <a:extLst>
+              <a:ext uri="{FF2B5EF4-FFF2-40B4-BE49-F238E27FC236}">
+                <a16:creationId xmlns:a16="http://schemas.microsoft.com/office/drawing/2014/main" id="{3567900C-54C2-B84B-AA8C-6C6EB9CCF89A}"/>
+              </a:ext>
+            </a:extLst>
+          </p:cNvPr>
+          <p:cNvSpPr txBox="1"/>
+          <p:nvPr/>
+        </p:nvSpPr>
+        <p:spPr>
+          <a:xfrm>
+            <a:off x="10313841" y="2320290"/>
+            <a:ext cx="1718139" cy="2862322"/>
+          </a:xfrm>
+          <a:prstGeom prst="rect">
+            <a:avLst/>
+          </a:prstGeom>
+          <a:noFill/>
+        </p:spPr>
+        <p:txBody>
+          <a:bodyPr wrap="square" rtlCol="0">
+            <a:spAutoFit/>
+          </a:bodyPr>
+          <a:lstStyle/>
+          <a:p>
+            <a:r>
+              <a:rPr lang="en-US" dirty="0">
+                <a:solidFill>
+                  <a:srgbClr val="FF0000"/>
+                </a:solidFill>
+              </a:rPr>
+              <a:t>Discussion question: Why do we complete these deep informal probes if we’ve already administered the standardized DEAP?</a:t>
+            </a:r>
+          </a:p>
+        </p:txBody>
+      </p:sp>
     </p:spTree>
     <p:extLst>
       <p:ext uri="{BB962C8B-B14F-4D97-AF65-F5344CB8AC3E}">
@@ -4967,15 +5140,38 @@
           <a:p>
             <a:r>
               <a:rPr lang="en-US" dirty="0"/>
-              <a:t>Video Title: SSD 2 Matthew DX1 Final Cluster Stop plus Fricative Probe</a:t>
-            </a:r>
-          </a:p>
-          <a:p>
-            <a:r>
-              <a:rPr lang="en-US"/>
-              <a:t>Add more videos for sound probes </a:t>
-            </a:r>
-            <a:endParaRPr lang="en-US" dirty="0"/>
+              <a:t>Add more probe videos if there’s time: </a:t>
+            </a:r>
+          </a:p>
+          <a:p>
+            <a:pPr lvl="1"/>
+            <a:r>
+              <a:rPr lang="en-US" dirty="0"/>
+              <a:t>Stopping probe: SSD 10</a:t>
+            </a:r>
+          </a:p>
+          <a:p>
+            <a:pPr lvl="1"/>
+            <a:r>
+              <a:rPr lang="en-US" dirty="0"/>
+              <a:t>Initial </a:t>
+            </a:r>
+            <a:r>
+              <a:rPr lang="en-US" dirty="0" err="1"/>
+              <a:t>s+stop</a:t>
+            </a:r>
+            <a:r>
+              <a:rPr lang="en-US" dirty="0"/>
+              <a:t> and </a:t>
+            </a:r>
+            <a:r>
+              <a:rPr lang="en-US" dirty="0" err="1"/>
+              <a:t>s+nasal</a:t>
+            </a:r>
+            <a:r>
+              <a:rPr lang="en-US" dirty="0"/>
+              <a:t> probe: SSD 5</a:t>
+            </a:r>
           </a:p>
         </p:txBody>
       </p:sp>

</xml_diff>